<commit_message>
Cleaned up and added slideshow pics.
</commit_message>
<xml_diff>
--- a/images/slider/17ways website.pptx
+++ b/images/slider/17ways website.pptx
@@ -8,7 +8,6 @@
     <p:sldId id="256" r:id="rId2"/>
     <p:sldId id="257" r:id="rId3"/>
     <p:sldId id="258" r:id="rId4"/>
-    <p:sldId id="259" r:id="rId5"/>
   </p:sldIdLst>
   <p:sldSz cx="9144000" cy="6858000" type="screen4x3"/>
   <p:notesSz cx="6858000" cy="9144000"/>
@@ -107,22 +106,6 @@
       </a:defRPr>
     </a:lvl9pPr>
   </p:defaultTextStyle>
-  <p:extLst>
-    <p:ext uri="{EFAFB233-063F-42B5-8137-9DF3F51BA10A}">
-      <p15:sldGuideLst xmlns:p15="http://schemas.microsoft.com/office/powerpoint/2012/main">
-        <p15:guide id="1" orient="horz" pos="2160">
-          <p15:clr>
-            <a:srgbClr val="A4A3A4"/>
-          </p15:clr>
-        </p15:guide>
-        <p15:guide id="2" pos="2880">
-          <p15:clr>
-            <a:srgbClr val="A4A3A4"/>
-          </p15:clr>
-        </p15:guide>
-      </p15:sldGuideLst>
-    </p:ext>
-  </p:extLst>
 </p:presentation>
 </file>
 
@@ -307,7 +290,7 @@
           <a:p>
             <a:fld id="{FCE55AB8-8DAF-DC4E-9F67-6AE616D067FE}" type="datetimeFigureOut">
               <a:rPr lang="en-US" smtClean="0"/>
-              <a:t>2/9/2015</a:t>
+              <a:t>10/02/15</a:t>
             </a:fld>
             <a:endParaRPr lang="en-US"/>
           </a:p>
@@ -477,7 +460,7 @@
           <a:p>
             <a:fld id="{FCE55AB8-8DAF-DC4E-9F67-6AE616D067FE}" type="datetimeFigureOut">
               <a:rPr lang="en-US" smtClean="0"/>
-              <a:t>2/9/2015</a:t>
+              <a:t>10/02/15</a:t>
             </a:fld>
             <a:endParaRPr lang="en-US"/>
           </a:p>
@@ -657,7 +640,7 @@
           <a:p>
             <a:fld id="{FCE55AB8-8DAF-DC4E-9F67-6AE616D067FE}" type="datetimeFigureOut">
               <a:rPr lang="en-US" smtClean="0"/>
-              <a:t>2/9/2015</a:t>
+              <a:t>10/02/15</a:t>
             </a:fld>
             <a:endParaRPr lang="en-US"/>
           </a:p>
@@ -827,7 +810,7 @@
           <a:p>
             <a:fld id="{FCE55AB8-8DAF-DC4E-9F67-6AE616D067FE}" type="datetimeFigureOut">
               <a:rPr lang="en-US" smtClean="0"/>
-              <a:t>2/9/2015</a:t>
+              <a:t>10/02/15</a:t>
             </a:fld>
             <a:endParaRPr lang="en-US"/>
           </a:p>
@@ -1073,7 +1056,7 @@
           <a:p>
             <a:fld id="{FCE55AB8-8DAF-DC4E-9F67-6AE616D067FE}" type="datetimeFigureOut">
               <a:rPr lang="en-US" smtClean="0"/>
-              <a:t>2/9/2015</a:t>
+              <a:t>10/02/15</a:t>
             </a:fld>
             <a:endParaRPr lang="en-US"/>
           </a:p>
@@ -1361,7 +1344,7 @@
           <a:p>
             <a:fld id="{FCE55AB8-8DAF-DC4E-9F67-6AE616D067FE}" type="datetimeFigureOut">
               <a:rPr lang="en-US" smtClean="0"/>
-              <a:t>2/9/2015</a:t>
+              <a:t>10/02/15</a:t>
             </a:fld>
             <a:endParaRPr lang="en-US"/>
           </a:p>
@@ -1783,7 +1766,7 @@
           <a:p>
             <a:fld id="{FCE55AB8-8DAF-DC4E-9F67-6AE616D067FE}" type="datetimeFigureOut">
               <a:rPr lang="en-US" smtClean="0"/>
-              <a:t>2/9/2015</a:t>
+              <a:t>10/02/15</a:t>
             </a:fld>
             <a:endParaRPr lang="en-US"/>
           </a:p>
@@ -1901,7 +1884,7 @@
           <a:p>
             <a:fld id="{FCE55AB8-8DAF-DC4E-9F67-6AE616D067FE}" type="datetimeFigureOut">
               <a:rPr lang="en-US" smtClean="0"/>
-              <a:t>2/9/2015</a:t>
+              <a:t>10/02/15</a:t>
             </a:fld>
             <a:endParaRPr lang="en-US"/>
           </a:p>
@@ -1996,7 +1979,7 @@
           <a:p>
             <a:fld id="{FCE55AB8-8DAF-DC4E-9F67-6AE616D067FE}" type="datetimeFigureOut">
               <a:rPr lang="en-US" smtClean="0"/>
-              <a:t>2/9/2015</a:t>
+              <a:t>10/02/15</a:t>
             </a:fld>
             <a:endParaRPr lang="en-US"/>
           </a:p>
@@ -2273,7 +2256,7 @@
           <a:p>
             <a:fld id="{FCE55AB8-8DAF-DC4E-9F67-6AE616D067FE}" type="datetimeFigureOut">
               <a:rPr lang="en-US" smtClean="0"/>
-              <a:t>2/9/2015</a:t>
+              <a:t>10/02/15</a:t>
             </a:fld>
             <a:endParaRPr lang="en-US"/>
           </a:p>
@@ -2526,7 +2509,7 @@
           <a:p>
             <a:fld id="{FCE55AB8-8DAF-DC4E-9F67-6AE616D067FE}" type="datetimeFigureOut">
               <a:rPr lang="en-US" smtClean="0"/>
-              <a:t>2/9/2015</a:t>
+              <a:t>10/02/15</a:t>
             </a:fld>
             <a:endParaRPr lang="en-US"/>
           </a:p>
@@ -2739,7 +2722,7 @@
           <a:p>
             <a:fld id="{FCE55AB8-8DAF-DC4E-9F67-6AE616D067FE}" type="datetimeFigureOut">
               <a:rPr lang="en-US" smtClean="0"/>
-              <a:t>2/9/2015</a:t>
+              <a:t>10/02/15</a:t>
             </a:fld>
             <a:endParaRPr lang="en-US"/>
           </a:p>
@@ -3183,14 +3166,14 @@
             <a:pPr algn="ctr"/>
             <a:r>
               <a:rPr lang="en-US" sz="4400" dirty="0" smtClean="0">
-                <a:latin typeface="Arial"/>
-                <a:cs typeface="Arial"/>
+                <a:latin typeface="Muli"/>
+                <a:cs typeface="Muli"/>
               </a:rPr>
               <a:t>Welcome to something new</a:t>
             </a:r>
             <a:endParaRPr lang="en-US" sz="4400" dirty="0">
-              <a:latin typeface="Arial"/>
-              <a:cs typeface="Arial"/>
+              <a:latin typeface="Muli"/>
+              <a:cs typeface="Muli"/>
             </a:endParaRPr>
           </a:p>
         </p:txBody>
@@ -3225,16 +3208,46 @@
           <a:chExt cx="0" cy="0"/>
         </a:xfrm>
       </p:grpSpPr>
-      <p:sp>
-        <p:nvSpPr>
-          <p:cNvPr id="4" name="TextBox 3"/>
+      <p:pic>
+        <p:nvPicPr>
+          <p:cNvPr id="2" name="Picture 1" descr="17ways_big_logo.png"/>
+          <p:cNvPicPr>
+            <a:picLocks noChangeAspect="1"/>
+          </p:cNvPicPr>
+          <p:nvPr/>
+        </p:nvPicPr>
+        <p:blipFill>
+          <a:blip r:embed="rId2">
+            <a:extLst>
+              <a:ext uri="{28A0092B-C50C-407E-A947-70E740481C1C}">
+                <a14:useLocalDpi xmlns:a14="http://schemas.microsoft.com/office/drawing/2010/main" val="0"/>
+              </a:ext>
+            </a:extLst>
+          </a:blip>
+          <a:stretch>
+            <a:fillRect/>
+          </a:stretch>
+        </p:blipFill>
+        <p:spPr>
+          <a:xfrm>
+            <a:off x="4318673" y="1971785"/>
+            <a:ext cx="4368668" cy="3276501"/>
+          </a:xfrm>
+          <a:prstGeom prst="rect">
+            <a:avLst/>
+          </a:prstGeom>
+        </p:spPr>
+      </p:pic>
+      <p:sp>
+        <p:nvSpPr>
+          <p:cNvPr id="3" name="TextBox 2"/>
           <p:cNvSpPr txBox="1"/>
           <p:nvPr/>
         </p:nvSpPr>
         <p:spPr>
           <a:xfrm>
-            <a:off x="2069263" y="1740808"/>
-            <a:ext cx="2825939" cy="369332"/>
+            <a:off x="271144" y="3124893"/>
+            <a:ext cx="4302989" cy="923330"/>
           </a:xfrm>
           <a:prstGeom prst="rect">
             <a:avLst/>
@@ -3248,96 +3261,15 @@
           <a:lstStyle/>
           <a:p>
             <a:r>
-              <a:rPr lang="en-US" dirty="0" smtClean="0"/>
-              <a:t>Welcome to something new</a:t>
-            </a:r>
-            <a:endParaRPr lang="en-US" dirty="0"/>
-          </a:p>
-        </p:txBody>
-      </p:sp>
-      <p:sp>
-        <p:nvSpPr>
-          <p:cNvPr id="5" name="Rectangle 4"/>
-          <p:cNvSpPr/>
-          <p:nvPr/>
-        </p:nvSpPr>
-        <p:spPr>
-          <a:xfrm>
-            <a:off x="0" y="0"/>
-            <a:ext cx="9144000" cy="6858000"/>
-          </a:xfrm>
-          <a:prstGeom prst="rect">
-            <a:avLst/>
-          </a:prstGeom>
-          <a:solidFill>
-            <a:schemeClr val="bg1"/>
-          </a:solidFill>
-        </p:spPr>
-        <p:style>
-          <a:lnRef idx="1">
-            <a:schemeClr val="accent1"/>
-          </a:lnRef>
-          <a:fillRef idx="3">
-            <a:schemeClr val="accent1"/>
-          </a:fillRef>
-          <a:effectRef idx="2">
-            <a:schemeClr val="accent1"/>
-          </a:effectRef>
-          <a:fontRef idx="minor">
-            <a:schemeClr val="lt1"/>
-          </a:fontRef>
-        </p:style>
-        <p:txBody>
-          <a:bodyPr rtlCol="0" anchor="ctr"/>
-          <a:lstStyle/>
-          <a:p>
-            <a:pPr algn="ctr"/>
-            <a:r>
-              <a:rPr lang="en-US" sz="4400" dirty="0" smtClean="0">
-                <a:solidFill>
-                  <a:schemeClr val="tx1"/>
-                </a:solidFill>
-                <a:latin typeface="Arial"/>
-                <a:cs typeface="Arial"/>
+              <a:rPr lang="en-US" sz="5400" dirty="0" smtClean="0">
+                <a:latin typeface="Muli"/>
+                <a:cs typeface="Muli"/>
               </a:rPr>
-              <a:t>			Welcome </a:t>
-            </a:r>
-            <a:r>
-              <a:rPr lang="en-US" sz="4400" dirty="0" smtClean="0">
-                <a:solidFill>
-                  <a:schemeClr val="tx1"/>
-                </a:solidFill>
-                <a:latin typeface="Arial"/>
-                <a:cs typeface="Arial"/>
-              </a:rPr>
-              <a:t>to       </a:t>
-            </a:r>
-            <a:r>
-              <a:rPr lang="en-US" sz="6600" dirty="0" smtClean="0">
-                <a:solidFill>
-                  <a:srgbClr val="0000FF"/>
-                </a:solidFill>
-                <a:latin typeface="Goudy Old Style"/>
-                <a:cs typeface="Goudy Old Style"/>
-              </a:rPr>
-              <a:t>17</a:t>
-            </a:r>
-            <a:r>
-              <a:rPr lang="en-US" sz="6600" dirty="0" smtClean="0">
-                <a:solidFill>
-                  <a:srgbClr val="000000"/>
-                </a:solidFill>
-                <a:latin typeface="Goudy Old Style"/>
-                <a:cs typeface="Goudy Old Style"/>
-              </a:rPr>
-              <a:t>Ways</a:t>
-            </a:r>
-            <a:endParaRPr lang="en-US" sz="4400" dirty="0">
-              <a:solidFill>
-                <a:srgbClr val="000000"/>
-              </a:solidFill>
-              <a:latin typeface="Goudy Old Style"/>
-              <a:cs typeface="Goudy Old Style"/>
+              <a:t>Welcome to</a:t>
+            </a:r>
+            <a:endParaRPr lang="en-US" sz="5400" dirty="0">
+              <a:latin typeface="Muli"/>
+              <a:cs typeface="Muli"/>
             </a:endParaRPr>
           </a:p>
         </p:txBody>
@@ -3352,13 +3284,6 @@
   <p:clrMapOvr>
     <a:masterClrMapping/>
   </p:clrMapOvr>
-  <p:timing>
-    <p:tnLst>
-      <p:par>
-        <p:cTn id="1" dur="indefinite" restart="never" nodeType="tmRoot"/>
-      </p:par>
-    </p:tnLst>
-  </p:timing>
 </p:sld>
 </file>
 
@@ -3379,6 +3304,36 @@
           <a:chExt cx="0" cy="0"/>
         </a:xfrm>
       </p:grpSpPr>
+      <p:pic>
+        <p:nvPicPr>
+          <p:cNvPr id="2" name="Picture 1" descr="17ways_big_logo.png"/>
+          <p:cNvPicPr>
+            <a:picLocks noChangeAspect="1"/>
+          </p:cNvPicPr>
+          <p:nvPr/>
+        </p:nvPicPr>
+        <p:blipFill>
+          <a:blip r:embed="rId2">
+            <a:extLst>
+              <a:ext uri="{28A0092B-C50C-407E-A947-70E740481C1C}">
+                <a14:useLocalDpi xmlns:a14="http://schemas.microsoft.com/office/drawing/2010/main" val="0"/>
+              </a:ext>
+            </a:extLst>
+          </a:blip>
+          <a:stretch>
+            <a:fillRect/>
+          </a:stretch>
+        </p:blipFill>
+        <p:spPr>
+          <a:xfrm>
+            <a:off x="0" y="-11552"/>
+            <a:ext cx="9159402" cy="6869552"/>
+          </a:xfrm>
+          <a:prstGeom prst="rect">
+            <a:avLst/>
+          </a:prstGeom>
+        </p:spPr>
+      </p:pic>
       <p:sp>
         <p:nvSpPr>
           <p:cNvPr id="3" name="TextBox 2"/>
@@ -3387,8 +3342,8 @@
         </p:nvSpPr>
         <p:spPr>
           <a:xfrm>
-            <a:off x="3059061" y="191559"/>
-            <a:ext cx="3225838" cy="923330"/>
+            <a:off x="4552380" y="4757030"/>
+            <a:ext cx="2454518" cy="646331"/>
           </a:xfrm>
           <a:prstGeom prst="rect">
             <a:avLst/>
@@ -3401,16 +3356,26 @@
           </a:bodyPr>
           <a:lstStyle/>
           <a:p>
-            <a:r>
-              <a:rPr lang="en-US" sz="5400" dirty="0" smtClean="0">
-                <a:latin typeface="Arial"/>
-                <a:cs typeface="Arial"/>
+            <a:pPr marL="68400" indent="-284400" algn="ctr">
+              <a:buFont typeface="Arial"/>
+              <a:buChar char="•"/>
+            </a:pPr>
+            <a:r>
+              <a:rPr lang="en-US" sz="3600" i="1" dirty="0" smtClean="0">
+                <a:solidFill>
+                  <a:srgbClr val="FF6600"/>
+                </a:solidFill>
+                <a:latin typeface="Muli"/>
+                <a:cs typeface="Muli"/>
               </a:rPr>
-              <a:t>Solutions.</a:t>
-            </a:r>
-            <a:endParaRPr lang="en-US" sz="5400" dirty="0">
-              <a:latin typeface="Arial"/>
-              <a:cs typeface="Arial"/>
+              <a:t>Solutions</a:t>
+            </a:r>
+            <a:endParaRPr lang="en-US" sz="3600" i="1" dirty="0">
+              <a:solidFill>
+                <a:srgbClr val="FF6600"/>
+              </a:solidFill>
+              <a:latin typeface="Muli"/>
+              <a:cs typeface="Muli"/>
             </a:endParaRPr>
           </a:p>
         </p:txBody>
@@ -3423,8 +3388,8 @@
         </p:nvSpPr>
         <p:spPr>
           <a:xfrm>
-            <a:off x="6141552" y="191559"/>
-            <a:ext cx="2686177" cy="923330"/>
+            <a:off x="2702293" y="4728493"/>
+            <a:ext cx="2018161" cy="646331"/>
           </a:xfrm>
           <a:prstGeom prst="rect">
             <a:avLst/>
@@ -3437,30 +3402,37 @@
           </a:bodyPr>
           <a:lstStyle/>
           <a:p>
-            <a:r>
-              <a:rPr lang="en-US" sz="5400" dirty="0" smtClean="0">
-                <a:latin typeface="Arial"/>
-                <a:cs typeface="Arial"/>
+            <a:pPr algn="ctr"/>
+            <a:r>
+              <a:rPr lang="en-US" sz="3600" i="1" dirty="0" smtClean="0">
+                <a:solidFill>
+                  <a:srgbClr val="FF6600"/>
+                </a:solidFill>
+                <a:latin typeface="Muli Italic"/>
+                <a:cs typeface="Muli Italic"/>
               </a:rPr>
-              <a:t>Results.</a:t>
-            </a:r>
-            <a:endParaRPr lang="en-US" sz="5400" dirty="0">
-              <a:latin typeface="Arial"/>
-              <a:cs typeface="Arial"/>
+              <a:t>Options</a:t>
+            </a:r>
+            <a:endParaRPr lang="en-US" sz="3600" i="1" dirty="0">
+              <a:solidFill>
+                <a:srgbClr val="FF6600"/>
+              </a:solidFill>
+              <a:latin typeface="Muli Italic"/>
+              <a:cs typeface="Muli Italic"/>
             </a:endParaRPr>
           </a:p>
         </p:txBody>
       </p:sp>
       <p:sp>
         <p:nvSpPr>
-          <p:cNvPr id="5" name="TextBox 4"/>
+          <p:cNvPr id="6" name="TextBox 5"/>
           <p:cNvSpPr txBox="1"/>
           <p:nvPr/>
         </p:nvSpPr>
         <p:spPr>
           <a:xfrm>
-            <a:off x="199784" y="191057"/>
-            <a:ext cx="2992864" cy="923330"/>
+            <a:off x="7035440" y="4757030"/>
+            <a:ext cx="2018501" cy="646331"/>
           </a:xfrm>
           <a:prstGeom prst="rect">
             <a:avLst/>
@@ -3473,378 +3445,34 @@
           </a:bodyPr>
           <a:lstStyle/>
           <a:p>
-            <a:r>
-              <a:rPr lang="en-US" sz="5400" b="1" dirty="0" smtClean="0">
-                <a:latin typeface="Arial"/>
-                <a:cs typeface="Arial"/>
+            <a:pPr marL="68400" indent="-284400" algn="ctr">
+              <a:buFont typeface="Arial"/>
+              <a:buChar char="•"/>
+            </a:pPr>
+            <a:r>
+              <a:rPr lang="en-US" sz="3600" i="1" dirty="0" smtClean="0">
+                <a:solidFill>
+                  <a:srgbClr val="FF6600"/>
+                </a:solidFill>
+                <a:latin typeface="Muli"/>
+                <a:cs typeface="Muli"/>
               </a:rPr>
-              <a:t>Options.</a:t>
-            </a:r>
-            <a:endParaRPr lang="en-US" sz="5400" b="1" dirty="0">
-              <a:latin typeface="Arial"/>
-              <a:cs typeface="Arial"/>
+              <a:t>Results</a:t>
+            </a:r>
+            <a:endParaRPr lang="en-US" sz="3600" i="1" dirty="0">
+              <a:solidFill>
+                <a:srgbClr val="FF6600"/>
+              </a:solidFill>
+              <a:latin typeface="Muli"/>
+              <a:cs typeface="Muli"/>
             </a:endParaRPr>
-          </a:p>
-        </p:txBody>
-      </p:sp>
-      <p:pic>
-        <p:nvPicPr>
-          <p:cNvPr id="6" name="Picture 5"/>
-          <p:cNvPicPr>
-            <a:picLocks noChangeAspect="1"/>
-          </p:cNvPicPr>
-          <p:nvPr/>
-        </p:nvPicPr>
-        <p:blipFill>
-          <a:blip r:embed="rId2"/>
-          <a:stretch>
-            <a:fillRect/>
-          </a:stretch>
-        </p:blipFill>
-        <p:spPr>
-          <a:xfrm>
-            <a:off x="6141552" y="3296931"/>
-            <a:ext cx="2645436" cy="1754268"/>
-          </a:xfrm>
-          <a:prstGeom prst="rect">
-            <a:avLst/>
-          </a:prstGeom>
-          <a:effectLst>
-            <a:glow rad="139700">
-              <a:schemeClr val="accent3">
-                <a:satMod val="175000"/>
-                <a:alpha val="40000"/>
-              </a:schemeClr>
-            </a:glow>
-          </a:effectLst>
-        </p:spPr>
-      </p:pic>
-      <p:sp>
-        <p:nvSpPr>
-          <p:cNvPr id="7" name="TextBox 6"/>
-          <p:cNvSpPr txBox="1"/>
-          <p:nvPr/>
-        </p:nvSpPr>
-        <p:spPr>
-          <a:xfrm>
-            <a:off x="334125" y="1757547"/>
-            <a:ext cx="7828759" cy="954107"/>
-          </a:xfrm>
-          <a:prstGeom prst="rect">
-            <a:avLst/>
-          </a:prstGeom>
-          <a:noFill/>
-        </p:spPr>
-        <p:txBody>
-          <a:bodyPr wrap="square" rtlCol="0">
-            <a:spAutoFit/>
-          </a:bodyPr>
-          <a:lstStyle/>
-          <a:p>
-            <a:r>
-              <a:rPr lang="en-US" sz="2800" dirty="0" smtClean="0">
-                <a:latin typeface="Arial"/>
-                <a:cs typeface="Arial"/>
-              </a:rPr>
-              <a:t>We listen to your need, research your requirements, and come up with options. </a:t>
-            </a:r>
-            <a:endParaRPr lang="en-US" sz="2800" dirty="0">
-              <a:latin typeface="Arial"/>
-              <a:cs typeface="Arial"/>
-            </a:endParaRPr>
-          </a:p>
-        </p:txBody>
-      </p:sp>
-      <p:sp>
-        <p:nvSpPr>
-          <p:cNvPr id="8" name="Down Arrow 7"/>
-          <p:cNvSpPr/>
-          <p:nvPr/>
-        </p:nvSpPr>
-        <p:spPr>
-          <a:xfrm>
-            <a:off x="1369991" y="1114387"/>
-            <a:ext cx="585102" cy="643160"/>
-          </a:xfrm>
-          <a:prstGeom prst="downArrow">
-            <a:avLst/>
-          </a:prstGeom>
-        </p:spPr>
-        <p:style>
-          <a:lnRef idx="2">
-            <a:schemeClr val="dk1">
-              <a:shade val="50000"/>
-            </a:schemeClr>
-          </a:lnRef>
-          <a:fillRef idx="1">
-            <a:schemeClr val="dk1"/>
-          </a:fillRef>
-          <a:effectRef idx="0">
-            <a:schemeClr val="dk1"/>
-          </a:effectRef>
-          <a:fontRef idx="minor">
-            <a:schemeClr val="lt1"/>
-          </a:fontRef>
-        </p:style>
-        <p:txBody>
-          <a:bodyPr rtlCol="0" anchor="ctr"/>
-          <a:lstStyle/>
-          <a:p>
-            <a:pPr algn="ctr"/>
-            <a:endParaRPr lang="en-US"/>
           </a:p>
         </p:txBody>
       </p:sp>
     </p:spTree>
     <p:extLst>
       <p:ext uri="{BB962C8B-B14F-4D97-AF65-F5344CB8AC3E}">
-        <p14:creationId xmlns:p14="http://schemas.microsoft.com/office/powerpoint/2010/main" val="2964425904"/>
-      </p:ext>
-    </p:extLst>
-  </p:cSld>
-  <p:clrMapOvr>
-    <a:masterClrMapping/>
-  </p:clrMapOvr>
-</p:sld>
-</file>
-
-<file path=ppt/slides/slide4.xml><?xml version="1.0" encoding="utf-8"?>
-<p:sld xmlns:a="http://schemas.openxmlformats.org/drawingml/2006/main" xmlns:r="http://schemas.openxmlformats.org/officeDocument/2006/relationships" xmlns:p="http://schemas.openxmlformats.org/presentationml/2006/main">
-  <p:cSld>
-    <p:spTree>
-      <p:nvGrpSpPr>
-        <p:cNvPr id="1" name=""/>
-        <p:cNvGrpSpPr/>
-        <p:nvPr/>
-      </p:nvGrpSpPr>
-      <p:grpSpPr>
-        <a:xfrm>
-          <a:off x="0" y="0"/>
-          <a:ext cx="0" cy="0"/>
-          <a:chOff x="0" y="0"/>
-          <a:chExt cx="0" cy="0"/>
-        </a:xfrm>
-      </p:grpSpPr>
-      <p:sp>
-        <p:nvSpPr>
-          <p:cNvPr id="3" name="TextBox 2"/>
-          <p:cNvSpPr txBox="1"/>
-          <p:nvPr/>
-        </p:nvSpPr>
-        <p:spPr>
-          <a:xfrm>
-            <a:off x="2787912" y="191559"/>
-            <a:ext cx="3531511" cy="923330"/>
-          </a:xfrm>
-          <a:prstGeom prst="rect">
-            <a:avLst/>
-          </a:prstGeom>
-          <a:noFill/>
-        </p:spPr>
-        <p:txBody>
-          <a:bodyPr wrap="none" rtlCol="0">
-            <a:spAutoFit/>
-          </a:bodyPr>
-          <a:lstStyle/>
-          <a:p>
-            <a:r>
-              <a:rPr lang="en-US" sz="5400" b="1" dirty="0" smtClean="0">
-                <a:latin typeface="Arial"/>
-                <a:cs typeface="Arial"/>
-              </a:rPr>
-              <a:t>Solutions.</a:t>
-            </a:r>
-            <a:endParaRPr lang="en-US" sz="5400" b="1" dirty="0">
-              <a:latin typeface="Arial"/>
-              <a:cs typeface="Arial"/>
-            </a:endParaRPr>
-          </a:p>
-        </p:txBody>
-      </p:sp>
-      <p:sp>
-        <p:nvSpPr>
-          <p:cNvPr id="4" name="TextBox 3"/>
-          <p:cNvSpPr txBox="1"/>
-          <p:nvPr/>
-        </p:nvSpPr>
-        <p:spPr>
-          <a:xfrm>
-            <a:off x="6141552" y="191559"/>
-            <a:ext cx="2686177" cy="923330"/>
-          </a:xfrm>
-          <a:prstGeom prst="rect">
-            <a:avLst/>
-          </a:prstGeom>
-          <a:noFill/>
-        </p:spPr>
-        <p:txBody>
-          <a:bodyPr wrap="none" rtlCol="0">
-            <a:spAutoFit/>
-          </a:bodyPr>
-          <a:lstStyle/>
-          <a:p>
-            <a:r>
-              <a:rPr lang="en-US" sz="5400" dirty="0" smtClean="0">
-                <a:latin typeface="Arial"/>
-                <a:cs typeface="Arial"/>
-              </a:rPr>
-              <a:t>Results.</a:t>
-            </a:r>
-            <a:endParaRPr lang="en-US" sz="5400" dirty="0">
-              <a:latin typeface="Arial"/>
-              <a:cs typeface="Arial"/>
-            </a:endParaRPr>
-          </a:p>
-        </p:txBody>
-      </p:sp>
-      <p:sp>
-        <p:nvSpPr>
-          <p:cNvPr id="5" name="TextBox 4"/>
-          <p:cNvSpPr txBox="1"/>
-          <p:nvPr/>
-        </p:nvSpPr>
-        <p:spPr>
-          <a:xfrm>
-            <a:off x="199784" y="191057"/>
-            <a:ext cx="2763610" cy="923330"/>
-          </a:xfrm>
-          <a:prstGeom prst="rect">
-            <a:avLst/>
-          </a:prstGeom>
-          <a:noFill/>
-        </p:spPr>
-        <p:txBody>
-          <a:bodyPr wrap="none" rtlCol="0">
-            <a:spAutoFit/>
-          </a:bodyPr>
-          <a:lstStyle/>
-          <a:p>
-            <a:r>
-              <a:rPr lang="en-US" sz="5400" dirty="0" smtClean="0">
-                <a:latin typeface="Arial"/>
-                <a:cs typeface="Arial"/>
-              </a:rPr>
-              <a:t>Options.</a:t>
-            </a:r>
-            <a:endParaRPr lang="en-US" sz="5400" dirty="0">
-              <a:latin typeface="Arial"/>
-              <a:cs typeface="Arial"/>
-            </a:endParaRPr>
-          </a:p>
-        </p:txBody>
-      </p:sp>
-      <p:pic>
-        <p:nvPicPr>
-          <p:cNvPr id="6" name="Picture 5"/>
-          <p:cNvPicPr>
-            <a:picLocks noChangeAspect="1"/>
-          </p:cNvPicPr>
-          <p:nvPr/>
-        </p:nvPicPr>
-        <p:blipFill>
-          <a:blip r:embed="rId2"/>
-          <a:stretch>
-            <a:fillRect/>
-          </a:stretch>
-        </p:blipFill>
-        <p:spPr>
-          <a:xfrm>
-            <a:off x="6141552" y="3296931"/>
-            <a:ext cx="2645436" cy="1754268"/>
-          </a:xfrm>
-          <a:prstGeom prst="rect">
-            <a:avLst/>
-          </a:prstGeom>
-          <a:effectLst>
-            <a:glow rad="139700">
-              <a:schemeClr val="accent3">
-                <a:satMod val="175000"/>
-                <a:alpha val="40000"/>
-              </a:schemeClr>
-            </a:glow>
-          </a:effectLst>
-        </p:spPr>
-      </p:pic>
-      <p:sp>
-        <p:nvSpPr>
-          <p:cNvPr id="7" name="TextBox 6"/>
-          <p:cNvSpPr txBox="1"/>
-          <p:nvPr/>
-        </p:nvSpPr>
-        <p:spPr>
-          <a:xfrm>
-            <a:off x="334125" y="1757547"/>
-            <a:ext cx="7828759" cy="523220"/>
-          </a:xfrm>
-          <a:prstGeom prst="rect">
-            <a:avLst/>
-          </a:prstGeom>
-          <a:noFill/>
-        </p:spPr>
-        <p:txBody>
-          <a:bodyPr wrap="square" rtlCol="0">
-            <a:spAutoFit/>
-          </a:bodyPr>
-          <a:lstStyle/>
-          <a:p>
-            <a:r>
-              <a:rPr lang="en-US" sz="2800" smtClean="0">
-                <a:latin typeface="Arial"/>
-                <a:cs typeface="Arial"/>
-              </a:rPr>
-              <a:t>We   </a:t>
-            </a:r>
-            <a:endParaRPr lang="en-US" sz="2800" dirty="0">
-              <a:latin typeface="Arial"/>
-              <a:cs typeface="Arial"/>
-            </a:endParaRPr>
-          </a:p>
-        </p:txBody>
-      </p:sp>
-      <p:sp>
-        <p:nvSpPr>
-          <p:cNvPr id="8" name="Down Arrow 7"/>
-          <p:cNvSpPr/>
-          <p:nvPr/>
-        </p:nvSpPr>
-        <p:spPr>
-          <a:xfrm>
-            <a:off x="3910189" y="1114889"/>
-            <a:ext cx="585102" cy="643160"/>
-          </a:xfrm>
-          <a:prstGeom prst="downArrow">
-            <a:avLst/>
-          </a:prstGeom>
-        </p:spPr>
-        <p:style>
-          <a:lnRef idx="2">
-            <a:schemeClr val="dk1">
-              <a:shade val="50000"/>
-            </a:schemeClr>
-          </a:lnRef>
-          <a:fillRef idx="1">
-            <a:schemeClr val="dk1"/>
-          </a:fillRef>
-          <a:effectRef idx="0">
-            <a:schemeClr val="dk1"/>
-          </a:effectRef>
-          <a:fontRef idx="minor">
-            <a:schemeClr val="lt1"/>
-          </a:fontRef>
-        </p:style>
-        <p:txBody>
-          <a:bodyPr rtlCol="0" anchor="ctr"/>
-          <a:lstStyle/>
-          <a:p>
-            <a:pPr algn="ctr"/>
-            <a:endParaRPr lang="en-US"/>
-          </a:p>
-        </p:txBody>
-      </p:sp>
-    </p:spTree>
-    <p:extLst>
-      <p:ext uri="{BB962C8B-B14F-4D97-AF65-F5344CB8AC3E}">
-        <p14:creationId xmlns:p14="http://schemas.microsoft.com/office/powerpoint/2010/main" val="761853988"/>
+        <p14:creationId xmlns:p14="http://schemas.microsoft.com/office/powerpoint/2010/main" val="3652358685"/>
       </p:ext>
     </p:extLst>
   </p:cSld>

</xml_diff>